<commit_message>
Modified Powerpoint Slides for upcoming presentation
</commit_message>
<xml_diff>
--- a/doc/teachercom_presentation.pptx
+++ b/doc/teachercom_presentation.pptx
@@ -8,9 +8,10 @@
     <p:sldId id="256" r:id="rId2"/>
     <p:sldId id="257" r:id="rId3"/>
     <p:sldId id="258" r:id="rId4"/>
-    <p:sldId id="261" r:id="rId5"/>
-    <p:sldId id="259" r:id="rId6"/>
-    <p:sldId id="260" r:id="rId7"/>
+    <p:sldId id="262" r:id="rId5"/>
+    <p:sldId id="261" r:id="rId6"/>
+    <p:sldId id="259" r:id="rId7"/>
+    <p:sldId id="260" r:id="rId8"/>
   </p:sldIdLst>
   <p:sldSz cx="9144000" cy="6858000" type="screen4x3"/>
   <p:notesSz cx="6858000" cy="9144000"/>
@@ -4483,11 +4484,7 @@
           <a:p>
             <a:r>
               <a:rPr lang="en-US" dirty="0" smtClean="0"/>
-              <a:t>Revolutionize your </a:t>
-            </a:r>
-            <a:r>
-              <a:rPr lang="en-US" dirty="0" smtClean="0"/>
-              <a:t>Parent contacts</a:t>
+              <a:t>Revolutionize your Parent contacts</a:t>
             </a:r>
             <a:endParaRPr lang="en-US" dirty="0"/>
           </a:p>
@@ -4570,13 +4567,13 @@
           <a:p>
             <a:r>
               <a:rPr lang="en-US" dirty="0" smtClean="0"/>
-              <a:t>Students falling behind and Parents are unaware</a:t>
+              <a:t>Students are falling behind and Parents are unaware</a:t>
             </a:r>
           </a:p>
           <a:p>
             <a:r>
               <a:rPr lang="en-US" dirty="0" smtClean="0"/>
-              <a:t>Communication is key</a:t>
+              <a:t>Consistent communication is key</a:t>
             </a:r>
             <a:endParaRPr lang="en-US" dirty="0"/>
           </a:p>
@@ -4624,7 +4621,7 @@
           <a:p>
             <a:r>
               <a:rPr lang="en-US" dirty="0" smtClean="0"/>
-              <a:t>What’s the solution?</a:t>
+              <a:t>What’s the Solution?</a:t>
             </a:r>
             <a:endParaRPr lang="en-US" dirty="0"/>
           </a:p>
@@ -4647,7 +4644,7 @@
           <a:p>
             <a:r>
               <a:rPr lang="en-US" dirty="0" smtClean="0"/>
-              <a:t>Fast, easy to use daily notification system</a:t>
+              <a:t>Fast, easy to use online notification system</a:t>
             </a:r>
           </a:p>
           <a:p>
@@ -4715,7 +4712,7 @@
           <a:p>
             <a:r>
               <a:rPr lang="en-US" dirty="0" smtClean="0"/>
-              <a:t>Target Audience</a:t>
+              <a:t>Obstacles to Consider</a:t>
             </a:r>
             <a:endParaRPr lang="en-US" dirty="0"/>
           </a:p>
@@ -4738,20 +4735,41 @@
           <a:p>
             <a:r>
               <a:rPr lang="en-US" dirty="0" smtClean="0"/>
-              <a:t>Educators at small school districts or independent schools</a:t>
+              <a:t>Schools have a limited IT resources</a:t>
             </a:r>
           </a:p>
           <a:p>
             <a:r>
               <a:rPr lang="en-US" dirty="0" smtClean="0"/>
-              <a:t>Educators at large school districts with overly complex interface systems</a:t>
+              <a:t>Schools have limited budgets</a:t>
             </a:r>
           </a:p>
           <a:p>
             <a:r>
               <a:rPr lang="en-US" dirty="0" smtClean="0"/>
-              <a:t>Educators at any school district unhappy with current notification model</a:t>
-            </a:r>
+              <a:t>Teachers have limited technology expertise</a:t>
+            </a:r>
+          </a:p>
+          <a:p>
+            <a:r>
+              <a:rPr lang="en-US" dirty="0" smtClean="0"/>
+              <a:t>Parents use different form of technology to </a:t>
+            </a:r>
+            <a:r>
+              <a:rPr lang="en-US" dirty="0" smtClean="0"/>
+              <a:t>communicate</a:t>
+            </a:r>
+          </a:p>
+          <a:p>
+            <a:r>
+              <a:rPr lang="en-US" dirty="0" smtClean="0"/>
+              <a:t>Legal Issues concerning Student data and </a:t>
+            </a:r>
+            <a:r>
+              <a:rPr lang="en-US" smtClean="0"/>
+              <a:t>parental consent</a:t>
+            </a:r>
+            <a:endParaRPr lang="en-US" smtClean="0"/>
           </a:p>
           <a:p>
             <a:endParaRPr lang="en-US" dirty="0"/>
@@ -4800,7 +4818,7 @@
           <a:p>
             <a:r>
               <a:rPr lang="en-US" dirty="0" smtClean="0"/>
-              <a:t>Technology Used</a:t>
+              <a:t>Target Audience</a:t>
             </a:r>
             <a:endParaRPr lang="en-US" dirty="0"/>
           </a:p>
@@ -4823,55 +4841,22 @@
           <a:p>
             <a:r>
               <a:rPr lang="en-US" dirty="0" smtClean="0"/>
-              <a:t/>
-            </a:r>
-            <a:br>
+              <a:t>Educators at small school districts or independent schools</a:t>
+            </a:r>
+          </a:p>
+          <a:p>
+            <a:r>
               <a:rPr lang="en-US" dirty="0" smtClean="0"/>
-            </a:br>
-            <a:r>
-              <a:rPr lang="en-US" dirty="0" err="1" smtClean="0"/>
-              <a:t>Django</a:t>
-            </a:r>
+              <a:t>Educators at large school districts with overly complex interface systems</a:t>
+            </a:r>
+          </a:p>
+          <a:p>
             <a:r>
               <a:rPr lang="en-US" dirty="0" smtClean="0"/>
-              <a:t> Python Framework</a:t>
-            </a:r>
-          </a:p>
-          <a:p>
-            <a:r>
-              <a:rPr lang="en-US" dirty="0" err="1" smtClean="0"/>
-              <a:t>Sqlite</a:t>
-            </a:r>
-            <a:r>
-              <a:rPr lang="en-US" dirty="0" smtClean="0"/>
-              <a:t> Database</a:t>
-            </a:r>
-          </a:p>
-          <a:p>
-            <a:r>
-              <a:rPr lang="en-US" dirty="0" err="1" smtClean="0"/>
-              <a:t>Nginx</a:t>
-            </a:r>
-            <a:r>
-              <a:rPr lang="en-US" dirty="0" smtClean="0"/>
-              <a:t> http server</a:t>
-            </a:r>
-          </a:p>
-          <a:p>
-            <a:r>
-              <a:rPr lang="en-US" dirty="0" smtClean="0"/>
-              <a:t>Twitter Bootstrap Front-end</a:t>
-            </a:r>
-          </a:p>
-          <a:p>
-            <a:r>
-              <a:rPr lang="en-US" dirty="0" err="1" smtClean="0"/>
-              <a:t>Twilio</a:t>
-            </a:r>
-            <a:r>
-              <a:rPr lang="en-US" dirty="0" smtClean="0"/>
-              <a:t> Cloud communications</a:t>
-            </a:r>
+              <a:t>Educators at any school district unhappy with current notification model</a:t>
+            </a:r>
+          </a:p>
+          <a:p>
             <a:endParaRPr lang="en-US" dirty="0"/>
           </a:p>
         </p:txBody>
@@ -4918,6 +4903,117 @@
           <a:p>
             <a:r>
               <a:rPr lang="en-US" dirty="0" smtClean="0"/>
+              <a:t>Technology Used</a:t>
+            </a:r>
+            <a:endParaRPr lang="en-US" dirty="0"/>
+          </a:p>
+        </p:txBody>
+      </p:sp>
+      <p:sp>
+        <p:nvSpPr>
+          <p:cNvPr id="3" name="Content Placeholder 2"/>
+          <p:cNvSpPr>
+            <a:spLocks noGrp="1"/>
+          </p:cNvSpPr>
+          <p:nvPr>
+            <p:ph idx="1"/>
+          </p:nvPr>
+        </p:nvSpPr>
+        <p:spPr/>
+        <p:txBody>
+          <a:bodyPr/>
+          <a:lstStyle/>
+          <a:p>
+            <a:r>
+              <a:rPr lang="en-US" dirty="0" err="1" smtClean="0"/>
+              <a:t>Django</a:t>
+            </a:r>
+            <a:r>
+              <a:rPr lang="en-US" dirty="0" smtClean="0"/>
+              <a:t> Python Framework</a:t>
+            </a:r>
+          </a:p>
+          <a:p>
+            <a:r>
+              <a:rPr lang="en-US" dirty="0" err="1" smtClean="0"/>
+              <a:t>Sqlite</a:t>
+            </a:r>
+            <a:r>
+              <a:rPr lang="en-US" dirty="0" smtClean="0"/>
+              <a:t> Database</a:t>
+            </a:r>
+          </a:p>
+          <a:p>
+            <a:r>
+              <a:rPr lang="en-US" dirty="0" err="1" smtClean="0"/>
+              <a:t>Nginx</a:t>
+            </a:r>
+            <a:r>
+              <a:rPr lang="en-US" dirty="0" smtClean="0"/>
+              <a:t> http server</a:t>
+            </a:r>
+          </a:p>
+          <a:p>
+            <a:r>
+              <a:rPr lang="en-US" dirty="0" smtClean="0"/>
+              <a:t>Twitter Bootstrap Front-end</a:t>
+            </a:r>
+          </a:p>
+          <a:p>
+            <a:r>
+              <a:rPr lang="en-US" dirty="0" err="1" smtClean="0"/>
+              <a:t>Twilio</a:t>
+            </a:r>
+            <a:r>
+              <a:rPr lang="en-US" dirty="0" smtClean="0"/>
+              <a:t> Cloud communications</a:t>
+            </a:r>
+            <a:endParaRPr lang="en-US" dirty="0"/>
+          </a:p>
+        </p:txBody>
+      </p:sp>
+    </p:spTree>
+  </p:cSld>
+  <p:clrMapOvr>
+    <a:masterClrMapping/>
+  </p:clrMapOvr>
+</p:sld>
+</file>
+
+<file path=ppt/slides/slide7.xml><?xml version="1.0" encoding="utf-8"?>
+<p:sld xmlns:a="http://schemas.openxmlformats.org/drawingml/2006/main" xmlns:r="http://schemas.openxmlformats.org/officeDocument/2006/relationships" xmlns:mc="http://schemas.openxmlformats.org/markup-compatibility/2006" xmlns:mv="urn:schemas-microsoft-com:mac:vml" xmlns:p="http://schemas.openxmlformats.org/presentationml/2006/main" mc:Ignorable="mv" mc:PreserveAttributes="mv:*">
+  <p:cSld>
+    <p:spTree>
+      <p:nvGrpSpPr>
+        <p:cNvPr id="1" name=""/>
+        <p:cNvGrpSpPr/>
+        <p:nvPr/>
+      </p:nvGrpSpPr>
+      <p:grpSpPr>
+        <a:xfrm>
+          <a:off x="0" y="0"/>
+          <a:ext cx="0" cy="0"/>
+          <a:chOff x="0" y="0"/>
+          <a:chExt cx="0" cy="0"/>
+        </a:xfrm>
+      </p:grpSpPr>
+      <p:sp>
+        <p:nvSpPr>
+          <p:cNvPr id="2" name="Title 1"/>
+          <p:cNvSpPr>
+            <a:spLocks noGrp="1"/>
+          </p:cNvSpPr>
+          <p:nvPr>
+            <p:ph type="title"/>
+          </p:nvPr>
+        </p:nvSpPr>
+        <p:spPr/>
+        <p:txBody>
+          <a:bodyPr/>
+          <a:lstStyle/>
+          <a:p>
+            <a:r>
+              <a:rPr lang="en-US" dirty="0" smtClean="0"/>
               <a:t>Enough talk….</a:t>
             </a:r>
             <a:endParaRPr lang="en-US" dirty="0"/>
@@ -4947,14 +5043,24 @@
           <a:p>
             <a:r>
               <a:rPr lang="en-US" dirty="0" smtClean="0"/>
-              <a:t>Run through existing users and their use cases</a:t>
+              <a:t>Discuss our Proposed Implementation Model</a:t>
             </a:r>
           </a:p>
           <a:p>
             <a:r>
               <a:rPr lang="en-US" dirty="0" smtClean="0"/>
-              <a:t>Discuss model of us and implementation</a:t>
-            </a:r>
+              <a:t>Next Steps for the project…</a:t>
+            </a:r>
+            <a:r>
+              <a:rPr lang="en-US" smtClean="0"/>
+              <a:t>..besides </a:t>
+            </a:r>
+            <a:r>
+              <a:rPr lang="en-US" dirty="0" smtClean="0"/>
+              <a:t>winning the power ball.</a:t>
+            </a:r>
+          </a:p>
+          <a:p>
             <a:endParaRPr lang="en-US" dirty="0"/>
           </a:p>
         </p:txBody>

</xml_diff>